<commit_message>
#5 Commit -Mejora y Adición del registro de ventas
Se añadió la opción de mostrar las facturas de todas las estaciones
</commit_message>
<xml_diff>
--- a/UML.pptx
+++ b/UML.pptx
@@ -104,7 +104,81 @@
       </a:defRPr>
     </a:lvl9pPr>
   </p:defaultTextStyle>
+  <p:extLst>
+    <p:ext uri="{EFAFB233-063F-42B5-8137-9DF3F51BA10A}">
+      <p15:sldGuideLst xmlns:p15="http://schemas.microsoft.com/office/powerpoint/2012/main"/>
+    </p:ext>
+  </p:extLst>
 </p:presentation>
+</file>
+
+<file path=ppt/changesInfos/changesInfo1.xml><?xml version="1.0" encoding="utf-8"?>
+<pc:chgInfo xmlns:a="http://schemas.openxmlformats.org/drawingml/2006/main" xmlns:r="http://schemas.openxmlformats.org/officeDocument/2006/relationships" xmlns:ac="http://schemas.microsoft.com/office/drawing/2013/main/command" xmlns:pc="http://schemas.microsoft.com/office/powerpoint/2013/main/command">
+  <pc:docChgLst>
+    <pc:chgData name="AndrésE Ramos" userId="699afa22cf2382d0" providerId="LiveId" clId="{E9027C64-0B3B-47A7-9971-6ECB6BD4B82B}"/>
+    <pc:docChg chg="undo custSel modSld">
+      <pc:chgData name="AndrésE Ramos" userId="699afa22cf2382d0" providerId="LiveId" clId="{E9027C64-0B3B-47A7-9971-6ECB6BD4B82B}" dt="2024-10-17T01:51:40.245" v="296" actId="1076"/>
+      <pc:docMkLst>
+        <pc:docMk/>
+      </pc:docMkLst>
+      <pc:sldChg chg="modSp mod">
+        <pc:chgData name="AndrésE Ramos" userId="699afa22cf2382d0" providerId="LiveId" clId="{E9027C64-0B3B-47A7-9971-6ECB6BD4B82B}" dt="2024-10-17T01:51:40.245" v="296" actId="1076"/>
+        <pc:sldMkLst>
+          <pc:docMk/>
+          <pc:sldMk cId="1286858207" sldId="256"/>
+        </pc:sldMkLst>
+        <pc:spChg chg="mod">
+          <ac:chgData name="AndrésE Ramos" userId="699afa22cf2382d0" providerId="LiveId" clId="{E9027C64-0B3B-47A7-9971-6ECB6BD4B82B}" dt="2024-10-17T01:51:40.245" v="296" actId="1076"/>
+          <ac:spMkLst>
+            <pc:docMk/>
+            <pc:sldMk cId="1286858207" sldId="256"/>
+            <ac:spMk id="11" creationId="{9CE08210-A2F3-9442-64B3-D04AC67F97B3}"/>
+          </ac:spMkLst>
+        </pc:spChg>
+        <pc:spChg chg="mod">
+          <ac:chgData name="AndrésE Ramos" userId="699afa22cf2382d0" providerId="LiveId" clId="{E9027C64-0B3B-47A7-9971-6ECB6BD4B82B}" dt="2024-10-17T01:51:36.742" v="295" actId="1076"/>
+          <ac:spMkLst>
+            <pc:docMk/>
+            <pc:sldMk cId="1286858207" sldId="256"/>
+            <ac:spMk id="12" creationId="{70C385FF-9402-9409-01CA-7C2CC9271DC6}"/>
+          </ac:spMkLst>
+        </pc:spChg>
+        <pc:spChg chg="mod">
+          <ac:chgData name="AndrésE Ramos" userId="699afa22cf2382d0" providerId="LiveId" clId="{E9027C64-0B3B-47A7-9971-6ECB6BD4B82B}" dt="2024-10-17T01:23:16.322" v="266" actId="1076"/>
+          <ac:spMkLst>
+            <pc:docMk/>
+            <pc:sldMk cId="1286858207" sldId="256"/>
+            <ac:spMk id="14" creationId="{7C7E3F09-730A-7ECC-CB74-EFFF9F401429}"/>
+          </ac:spMkLst>
+        </pc:spChg>
+        <pc:graphicFrameChg chg="mod modGraphic">
+          <ac:chgData name="AndrésE Ramos" userId="699afa22cf2382d0" providerId="LiveId" clId="{E9027C64-0B3B-47A7-9971-6ECB6BD4B82B}" dt="2024-10-17T01:23:11.204" v="265" actId="1076"/>
+          <ac:graphicFrameMkLst>
+            <pc:docMk/>
+            <pc:sldMk cId="1286858207" sldId="256"/>
+            <ac:graphicFrameMk id="4" creationId="{ED2FE9D3-710A-0287-538E-CD46A3453D26}"/>
+          </ac:graphicFrameMkLst>
+        </pc:graphicFrameChg>
+        <pc:graphicFrameChg chg="mod modGraphic">
+          <ac:chgData name="AndrésE Ramos" userId="699afa22cf2382d0" providerId="LiveId" clId="{E9027C64-0B3B-47A7-9971-6ECB6BD4B82B}" dt="2024-10-17T01:40:22.273" v="294" actId="20577"/>
+          <ac:graphicFrameMkLst>
+            <pc:docMk/>
+            <pc:sldMk cId="1286858207" sldId="256"/>
+            <ac:graphicFrameMk id="7" creationId="{C0D3ED87-FB1A-885B-0987-B50AAC98DE82}"/>
+          </ac:graphicFrameMkLst>
+        </pc:graphicFrameChg>
+        <pc:cxnChg chg="mod">
+          <ac:chgData name="AndrésE Ramos" userId="699afa22cf2382d0" providerId="LiveId" clId="{E9027C64-0B3B-47A7-9971-6ECB6BD4B82B}" dt="2024-10-17T01:29:50.358" v="293" actId="14100"/>
+          <ac:cxnSpMkLst>
+            <pc:docMk/>
+            <pc:sldMk cId="1286858207" sldId="256"/>
+            <ac:cxnSpMk id="9" creationId="{E95270C3-29C9-E70A-E01C-43357A1B8A86}"/>
+          </ac:cxnSpMkLst>
+        </pc:cxnChg>
+      </pc:sldChg>
+    </pc:docChg>
+  </pc:docChgLst>
+</pc:chgInfo>
 </file>
 
 <file path=ppt/slideLayouts/slideLayout1.xml><?xml version="1.0" encoding="utf-8"?>
@@ -256,7 +330,7 @@
           <a:p>
             <a:fld id="{9156957F-D154-4A50-9D05-1CA145B07DAB}" type="datetimeFigureOut">
               <a:rPr lang="es-CO" smtClean="0"/>
-              <a:t>12/10/2024</a:t>
+              <a:t>16/10/2024</a:t>
             </a:fld>
             <a:endParaRPr lang="es-CO"/>
           </a:p>
@@ -456,7 +530,7 @@
           <a:p>
             <a:fld id="{9156957F-D154-4A50-9D05-1CA145B07DAB}" type="datetimeFigureOut">
               <a:rPr lang="es-CO" smtClean="0"/>
-              <a:t>12/10/2024</a:t>
+              <a:t>16/10/2024</a:t>
             </a:fld>
             <a:endParaRPr lang="es-CO"/>
           </a:p>
@@ -666,7 +740,7 @@
           <a:p>
             <a:fld id="{9156957F-D154-4A50-9D05-1CA145B07DAB}" type="datetimeFigureOut">
               <a:rPr lang="es-CO" smtClean="0"/>
-              <a:t>12/10/2024</a:t>
+              <a:t>16/10/2024</a:t>
             </a:fld>
             <a:endParaRPr lang="es-CO"/>
           </a:p>
@@ -866,7 +940,7 @@
           <a:p>
             <a:fld id="{9156957F-D154-4A50-9D05-1CA145B07DAB}" type="datetimeFigureOut">
               <a:rPr lang="es-CO" smtClean="0"/>
-              <a:t>12/10/2024</a:t>
+              <a:t>16/10/2024</a:t>
             </a:fld>
             <a:endParaRPr lang="es-CO"/>
           </a:p>
@@ -1142,7 +1216,7 @@
           <a:p>
             <a:fld id="{9156957F-D154-4A50-9D05-1CA145B07DAB}" type="datetimeFigureOut">
               <a:rPr lang="es-CO" smtClean="0"/>
-              <a:t>12/10/2024</a:t>
+              <a:t>16/10/2024</a:t>
             </a:fld>
             <a:endParaRPr lang="es-CO"/>
           </a:p>
@@ -1410,7 +1484,7 @@
           <a:p>
             <a:fld id="{9156957F-D154-4A50-9D05-1CA145B07DAB}" type="datetimeFigureOut">
               <a:rPr lang="es-CO" smtClean="0"/>
-              <a:t>12/10/2024</a:t>
+              <a:t>16/10/2024</a:t>
             </a:fld>
             <a:endParaRPr lang="es-CO"/>
           </a:p>
@@ -1825,7 +1899,7 @@
           <a:p>
             <a:fld id="{9156957F-D154-4A50-9D05-1CA145B07DAB}" type="datetimeFigureOut">
               <a:rPr lang="es-CO" smtClean="0"/>
-              <a:t>12/10/2024</a:t>
+              <a:t>16/10/2024</a:t>
             </a:fld>
             <a:endParaRPr lang="es-CO"/>
           </a:p>
@@ -1967,7 +2041,7 @@
           <a:p>
             <a:fld id="{9156957F-D154-4A50-9D05-1CA145B07DAB}" type="datetimeFigureOut">
               <a:rPr lang="es-CO" smtClean="0"/>
-              <a:t>12/10/2024</a:t>
+              <a:t>16/10/2024</a:t>
             </a:fld>
             <a:endParaRPr lang="es-CO"/>
           </a:p>
@@ -2080,7 +2154,7 @@
           <a:p>
             <a:fld id="{9156957F-D154-4A50-9D05-1CA145B07DAB}" type="datetimeFigureOut">
               <a:rPr lang="es-CO" smtClean="0"/>
-              <a:t>12/10/2024</a:t>
+              <a:t>16/10/2024</a:t>
             </a:fld>
             <a:endParaRPr lang="es-CO"/>
           </a:p>
@@ -2393,7 +2467,7 @@
           <a:p>
             <a:fld id="{9156957F-D154-4A50-9D05-1CA145B07DAB}" type="datetimeFigureOut">
               <a:rPr lang="es-CO" smtClean="0"/>
-              <a:t>12/10/2024</a:t>
+              <a:t>16/10/2024</a:t>
             </a:fld>
             <a:endParaRPr lang="es-CO"/>
           </a:p>
@@ -2682,7 +2756,7 @@
           <a:p>
             <a:fld id="{9156957F-D154-4A50-9D05-1CA145B07DAB}" type="datetimeFigureOut">
               <a:rPr lang="es-CO" smtClean="0"/>
-              <a:t>12/10/2024</a:t>
+              <a:t>16/10/2024</a:t>
             </a:fld>
             <a:endParaRPr lang="es-CO"/>
           </a:p>
@@ -2925,7 +2999,7 @@
           <a:p>
             <a:fld id="{9156957F-D154-4A50-9D05-1CA145B07DAB}" type="datetimeFigureOut">
               <a:rPr lang="es-CO" smtClean="0"/>
-              <a:t>12/10/2024</a:t>
+              <a:t>16/10/2024</a:t>
             </a:fld>
             <a:endParaRPr lang="es-CO"/>
           </a:p>
@@ -3357,14 +3431,14 @@
           <p:nvPr>
             <p:extLst>
               <p:ext uri="{D42A27DB-BD31-4B8C-83A1-F6EECF244321}">
-                <p14:modId xmlns:p14="http://schemas.microsoft.com/office/powerpoint/2010/main" val="3696217196"/>
+                <p14:modId xmlns:p14="http://schemas.microsoft.com/office/powerpoint/2010/main" val="1257000994"/>
               </p:ext>
             </p:extLst>
           </p:nvPr>
         </p:nvGraphicFramePr>
         <p:xfrm>
-          <a:off x="578500" y="924938"/>
-          <a:ext cx="3536302" cy="3948297"/>
+          <a:off x="439960" y="283918"/>
+          <a:ext cx="4501392" cy="5809139"/>
         </p:xfrm>
         <a:graphic>
           <a:graphicData uri="http://schemas.openxmlformats.org/drawingml/2006/table">
@@ -3373,7 +3447,531 @@
                 <a:tableStyleId>{D7AC3CCA-C797-4891-BE02-D94E43425B78}</a:tableStyleId>
               </a:tblPr>
               <a:tblGrid>
-                <a:gridCol w="3536302">
+                <a:gridCol w="4501392">
+                  <a:extLst>
+                    <a:ext uri="{9D8B030D-6E8A-4147-A177-3AD203B41FA5}">
+                      <a16:colId xmlns:a16="http://schemas.microsoft.com/office/drawing/2014/main" val="869675443"/>
+                    </a:ext>
+                  </a:extLst>
+                </a:gridCol>
+              </a:tblGrid>
+              <a:tr h="469712">
+                <a:tc>
+                  <a:txBody>
+                    <a:bodyPr/>
+                    <a:lstStyle/>
+                    <a:p>
+                      <a:pPr algn="ctr"/>
+                      <a:r>
+                        <a:rPr lang="es-ES" sz="1600" dirty="0"/>
+                        <a:t>Estación</a:t>
+                      </a:r>
+                      <a:endParaRPr lang="es-CO" sz="1600" dirty="0"/>
+                    </a:p>
+                  </a:txBody>
+                  <a:tcPr/>
+                </a:tc>
+                <a:extLst>
+                  <a:ext uri="{0D108BD9-81ED-4DB2-BD59-A6C34878D82A}">
+                    <a16:rowId xmlns:a16="http://schemas.microsoft.com/office/drawing/2014/main" val="4245628218"/>
+                  </a:ext>
+                </a:extLst>
+              </a:tr>
+              <a:tr h="2149873">
+                <a:tc>
+                  <a:txBody>
+                    <a:bodyPr/>
+                    <a:lstStyle/>
+                    <a:p>
+                      <a:pPr marL="285750" indent="-285750">
+                        <a:buFontTx/>
+                        <a:buChar char="-"/>
+                      </a:pPr>
+                      <a:r>
+                        <a:rPr lang="es-CO" sz="1600" dirty="0"/>
+                        <a:t>numero: </a:t>
+                      </a:r>
+                      <a:r>
+                        <a:rPr lang="es-CO" sz="1600" dirty="0" err="1"/>
+                        <a:t>int</a:t>
+                      </a:r>
+                      <a:endParaRPr lang="es-CO" sz="1600" dirty="0"/>
+                    </a:p>
+                    <a:p>
+                      <a:pPr marL="285750" indent="-285750">
+                        <a:buFontTx/>
+                        <a:buChar char="-"/>
+                      </a:pPr>
+                      <a:r>
+                        <a:rPr lang="es-CO" sz="1600" dirty="0"/>
+                        <a:t>nombre: </a:t>
+                      </a:r>
+                      <a:r>
+                        <a:rPr lang="es-CO" sz="1600" dirty="0" err="1"/>
+                        <a:t>string</a:t>
+                      </a:r>
+                      <a:endParaRPr lang="es-CO" sz="1600" dirty="0"/>
+                    </a:p>
+                    <a:p>
+                      <a:pPr marL="285750" indent="-285750">
+                        <a:buFontTx/>
+                        <a:buChar char="-"/>
+                      </a:pPr>
+                      <a:r>
+                        <a:rPr lang="es-CO" sz="1600" dirty="0" err="1"/>
+                        <a:t>nombreRed</a:t>
+                      </a:r>
+                      <a:r>
+                        <a:rPr lang="es-CO" sz="1600" dirty="0"/>
+                        <a:t>: </a:t>
+                      </a:r>
+                      <a:r>
+                        <a:rPr lang="es-CO" sz="1600" dirty="0" err="1"/>
+                        <a:t>string</a:t>
+                      </a:r>
+                      <a:r>
+                        <a:rPr lang="es-CO" sz="1600" dirty="0"/>
+                        <a:t>-</a:t>
+                      </a:r>
+                    </a:p>
+                    <a:p>
+                      <a:pPr marL="285750" indent="-285750">
+                        <a:buFontTx/>
+                        <a:buChar char="-"/>
+                      </a:pPr>
+                      <a:r>
+                        <a:rPr lang="es-CO" sz="1600" dirty="0"/>
+                        <a:t> </a:t>
+                      </a:r>
+                      <a:r>
+                        <a:rPr lang="es-CO" sz="1600" dirty="0" err="1"/>
+                        <a:t>precioRegular</a:t>
+                      </a:r>
+                      <a:r>
+                        <a:rPr lang="es-CO" sz="1600" dirty="0"/>
+                        <a:t>: </a:t>
+                      </a:r>
+                      <a:r>
+                        <a:rPr lang="es-CO" sz="1600" dirty="0" err="1"/>
+                        <a:t>double</a:t>
+                      </a:r>
+                      <a:r>
+                        <a:rPr lang="es-CO" sz="1600" dirty="0"/>
+                        <a:t>-</a:t>
+                      </a:r>
+                    </a:p>
+                    <a:p>
+                      <a:pPr marL="285750" indent="-285750">
+                        <a:buFontTx/>
+                        <a:buChar char="-"/>
+                      </a:pPr>
+                      <a:r>
+                        <a:rPr lang="es-CO" sz="1600" dirty="0"/>
+                        <a:t> </a:t>
+                      </a:r>
+                      <a:r>
+                        <a:rPr lang="es-CO" sz="1600" dirty="0" err="1"/>
+                        <a:t>precioPremium</a:t>
+                      </a:r>
+                      <a:r>
+                        <a:rPr lang="es-CO" sz="1600" dirty="0"/>
+                        <a:t>: </a:t>
+                      </a:r>
+                      <a:r>
+                        <a:rPr lang="es-CO" sz="1600" dirty="0" err="1"/>
+                        <a:t>double</a:t>
+                      </a:r>
+                      <a:endParaRPr lang="es-CO" sz="1600" dirty="0"/>
+                    </a:p>
+                    <a:p>
+                      <a:pPr marL="285750" indent="-285750">
+                        <a:buFontTx/>
+                        <a:buChar char="-"/>
+                      </a:pPr>
+                      <a:r>
+                        <a:rPr lang="es-CO" sz="1600" dirty="0"/>
+                        <a:t> </a:t>
+                      </a:r>
+                      <a:r>
+                        <a:rPr lang="es-CO" sz="1600" dirty="0" err="1"/>
+                        <a:t>precioEcoExtra</a:t>
+                      </a:r>
+                      <a:r>
+                        <a:rPr lang="es-CO" sz="1600" dirty="0"/>
+                        <a:t>: </a:t>
+                      </a:r>
+                      <a:r>
+                        <a:rPr lang="es-CO" sz="1600" dirty="0" err="1"/>
+                        <a:t>double</a:t>
+                      </a:r>
+                      <a:endParaRPr lang="es-CO" sz="1600" dirty="0"/>
+                    </a:p>
+                    <a:p>
+                      <a:pPr marL="285750" indent="-285750">
+                        <a:buFontTx/>
+                        <a:buChar char="-"/>
+                      </a:pPr>
+                      <a:r>
+                        <a:rPr lang="es-CO" sz="1600" dirty="0"/>
+                        <a:t> </a:t>
+                      </a:r>
+                      <a:r>
+                        <a:rPr lang="es-CO" sz="1600" dirty="0" err="1"/>
+                        <a:t>inventarioRegular</a:t>
+                      </a:r>
+                      <a:r>
+                        <a:rPr lang="es-CO" sz="1600" dirty="0"/>
+                        <a:t>: </a:t>
+                      </a:r>
+                      <a:r>
+                        <a:rPr lang="es-CO" sz="1600" dirty="0" err="1"/>
+                        <a:t>double</a:t>
+                      </a:r>
+                      <a:r>
+                        <a:rPr lang="es-CO" sz="1600" dirty="0"/>
+                        <a:t> (valor: 200)</a:t>
+                      </a:r>
+                    </a:p>
+                    <a:p>
+                      <a:pPr marL="285750" indent="-285750">
+                        <a:buFontTx/>
+                        <a:buChar char="-"/>
+                      </a:pPr>
+                      <a:r>
+                        <a:rPr lang="es-CO" sz="1600" dirty="0"/>
+                        <a:t> </a:t>
+                      </a:r>
+                      <a:r>
+                        <a:rPr lang="es-CO" sz="1600" dirty="0" err="1"/>
+                        <a:t>inventarioPremium</a:t>
+                      </a:r>
+                      <a:r>
+                        <a:rPr lang="es-CO" sz="1600" dirty="0"/>
+                        <a:t>: </a:t>
+                      </a:r>
+                      <a:r>
+                        <a:rPr lang="es-CO" sz="1600" dirty="0" err="1"/>
+                        <a:t>double</a:t>
+                      </a:r>
+                      <a:r>
+                        <a:rPr lang="es-CO" sz="1600" dirty="0"/>
+                        <a:t> (valor : 200) </a:t>
+                      </a:r>
+                    </a:p>
+                    <a:p>
+                      <a:pPr marL="285750" indent="-285750">
+                        <a:buFontTx/>
+                        <a:buChar char="-"/>
+                      </a:pPr>
+                      <a:r>
+                        <a:rPr lang="es-CO" sz="1600" dirty="0" err="1"/>
+                        <a:t>inventarioEcoExtra</a:t>
+                      </a:r>
+                      <a:r>
+                        <a:rPr lang="es-CO" sz="1600" dirty="0"/>
+                        <a:t>: </a:t>
+                      </a:r>
+                      <a:r>
+                        <a:rPr lang="es-CO" sz="1600" dirty="0" err="1"/>
+                        <a:t>double</a:t>
+                      </a:r>
+                      <a:r>
+                        <a:rPr lang="es-CO" sz="1600" dirty="0"/>
+                        <a:t> (valor: 200)</a:t>
+                      </a:r>
+                    </a:p>
+                  </a:txBody>
+                  <a:tcPr/>
+                </a:tc>
+                <a:extLst>
+                  <a:ext uri="{0D108BD9-81ED-4DB2-BD59-A6C34878D82A}">
+                    <a16:rowId xmlns:a16="http://schemas.microsoft.com/office/drawing/2014/main" val="2497062512"/>
+                  </a:ext>
+                </a:extLst>
+              </a:tr>
+              <a:tr h="3053427">
+                <a:tc>
+                  <a:txBody>
+                    <a:bodyPr/>
+                    <a:lstStyle/>
+                    <a:p>
+                      <a:r>
+                        <a:rPr lang="en-US" sz="1600" dirty="0"/>
+                        <a:t>+ </a:t>
+                      </a:r>
+                      <a:r>
+                        <a:rPr lang="en-US" sz="1600" dirty="0" err="1"/>
+                        <a:t>Estacion</a:t>
+                      </a:r>
+                      <a:r>
+                        <a:rPr lang="en-US" sz="1600" dirty="0"/>
+                        <a:t>(int </a:t>
+                      </a:r>
+                      <a:r>
+                        <a:rPr lang="en-US" sz="1600" dirty="0" err="1"/>
+                        <a:t>numero</a:t>
+                      </a:r>
+                      <a:r>
+                        <a:rPr lang="en-US" sz="1600" dirty="0"/>
+                        <a:t>, const string&amp; </a:t>
+                      </a:r>
+                      <a:r>
+                        <a:rPr lang="en-US" sz="1600" dirty="0" err="1"/>
+                        <a:t>nombre</a:t>
+                      </a:r>
+                      <a:r>
+                        <a:rPr lang="en-US" sz="1600" dirty="0"/>
+                        <a:t>, const string&amp; </a:t>
+                      </a:r>
+                      <a:r>
+                        <a:rPr lang="en-US" sz="1600" dirty="0" err="1"/>
+                        <a:t>nombreRed</a:t>
+                      </a:r>
+                      <a:r>
+                        <a:rPr lang="en-US" sz="1600" dirty="0"/>
+                        <a:t>, double </a:t>
+                      </a:r>
+                      <a:r>
+                        <a:rPr lang="en-US" sz="1600" dirty="0" err="1"/>
+                        <a:t>precioRegular</a:t>
+                      </a:r>
+                      <a:r>
+                        <a:rPr lang="en-US" sz="1600" dirty="0"/>
+                        <a:t>, double </a:t>
+                      </a:r>
+                      <a:r>
+                        <a:rPr lang="en-US" sz="1600" dirty="0" err="1"/>
+                        <a:t>precioPremium</a:t>
+                      </a:r>
+                      <a:r>
+                        <a:rPr lang="en-US" sz="1600" dirty="0"/>
+                        <a:t>, double </a:t>
+                      </a:r>
+                      <a:r>
+                        <a:rPr lang="en-US" sz="1600" dirty="0" err="1"/>
+                        <a:t>precioEcoExtra</a:t>
+                      </a:r>
+                      <a:r>
+                        <a:rPr lang="en-US" sz="1600" dirty="0"/>
+                        <a:t>)</a:t>
+                      </a:r>
+                    </a:p>
+                    <a:p>
+                      <a:r>
+                        <a:rPr lang="en-US" sz="1600" dirty="0"/>
+                        <a:t>+ </a:t>
+                      </a:r>
+                      <a:r>
+                        <a:rPr lang="en-US" sz="1600" dirty="0" err="1"/>
+                        <a:t>mostrarInfo</a:t>
+                      </a:r>
+                      <a:r>
+                        <a:rPr lang="en-US" sz="1600" dirty="0"/>
+                        <a:t>() const: void</a:t>
+                      </a:r>
+                    </a:p>
+                    <a:p>
+                      <a:r>
+                        <a:rPr lang="en-US" sz="1600" dirty="0"/>
+                        <a:t>+ </a:t>
+                      </a:r>
+                      <a:r>
+                        <a:rPr lang="en-US" sz="1600" dirty="0" err="1"/>
+                        <a:t>registrarVenta</a:t>
+                      </a:r>
+                      <a:r>
+                        <a:rPr lang="en-US" sz="1600" dirty="0"/>
+                        <a:t>(double </a:t>
+                      </a:r>
+                      <a:r>
+                        <a:rPr lang="en-US" sz="1600" dirty="0" err="1"/>
+                        <a:t>cantidad</a:t>
+                      </a:r>
+                      <a:r>
+                        <a:rPr lang="en-US" sz="1600" dirty="0"/>
+                        <a:t>, const string&amp; </a:t>
+                      </a:r>
+                      <a:r>
+                        <a:rPr lang="en-US" sz="1600" dirty="0" err="1"/>
+                        <a:t>tipoGasolina</a:t>
+                      </a:r>
+                      <a:r>
+                        <a:rPr lang="en-US" sz="1600" dirty="0"/>
+                        <a:t>, const string&amp; </a:t>
+                      </a:r>
+                      <a:r>
+                        <a:rPr lang="en-US" sz="1600" dirty="0" err="1"/>
+                        <a:t>metodoPago</a:t>
+                      </a:r>
+                      <a:r>
+                        <a:rPr lang="en-US" sz="1600" dirty="0"/>
+                        <a:t>): void</a:t>
+                      </a:r>
+                    </a:p>
+                    <a:p>
+                      <a:r>
+                        <a:rPr lang="en-US" sz="1600" dirty="0"/>
+                        <a:t>+ </a:t>
+                      </a:r>
+                      <a:r>
+                        <a:rPr lang="en-US" sz="1600" dirty="0" err="1"/>
+                        <a:t>venderGasolina</a:t>
+                      </a:r>
+                      <a:r>
+                        <a:rPr lang="en-US" sz="1600" dirty="0"/>
+                        <a:t>(double </a:t>
+                      </a:r>
+                      <a:r>
+                        <a:rPr lang="en-US" sz="1600" dirty="0" err="1"/>
+                        <a:t>cantidad</a:t>
+                      </a:r>
+                      <a:r>
+                        <a:rPr lang="en-US" sz="1600" dirty="0"/>
+                        <a:t>, const string&amp; </a:t>
+                      </a:r>
+                      <a:r>
+                        <a:rPr lang="en-US" sz="1600" dirty="0" err="1"/>
+                        <a:t>tipoGasolina</a:t>
+                      </a:r>
+                      <a:r>
+                        <a:rPr lang="en-US" sz="1600" dirty="0"/>
+                        <a:t>): bool</a:t>
+                      </a:r>
+                    </a:p>
+                    <a:p>
+                      <a:r>
+                        <a:rPr lang="en-US" sz="1600" dirty="0"/>
+                        <a:t>+ </a:t>
+                      </a:r>
+                      <a:r>
+                        <a:rPr lang="en-US" sz="1600" dirty="0" err="1"/>
+                        <a:t>toString</a:t>
+                      </a:r>
+                      <a:r>
+                        <a:rPr lang="en-US" sz="1600" dirty="0"/>
+                        <a:t>() const: string+ </a:t>
+                      </a:r>
+                      <a:r>
+                        <a:rPr lang="en-US" sz="1600" dirty="0" err="1"/>
+                        <a:t>getNumero</a:t>
+                      </a:r>
+                      <a:r>
+                        <a:rPr lang="en-US" sz="1600" dirty="0"/>
+                        <a:t>() const: int</a:t>
+                      </a:r>
+                    </a:p>
+                    <a:p>
+                      <a:r>
+                        <a:rPr lang="en-US" sz="1600" dirty="0"/>
+                        <a:t>+ </a:t>
+                      </a:r>
+                      <a:r>
+                        <a:rPr lang="en-US" sz="1600" dirty="0" err="1"/>
+                        <a:t>setPrecioRegular</a:t>
+                      </a:r>
+                      <a:r>
+                        <a:rPr lang="en-US" sz="1600" dirty="0"/>
+                        <a:t>(double </a:t>
+                      </a:r>
+                      <a:r>
+                        <a:rPr lang="en-US" sz="1600" dirty="0" err="1"/>
+                        <a:t>nuevoPrecio</a:t>
+                      </a:r>
+                      <a:r>
+                        <a:rPr lang="en-US" sz="1600" dirty="0"/>
+                        <a:t>): void</a:t>
+                      </a:r>
+                    </a:p>
+                    <a:p>
+                      <a:r>
+                        <a:rPr lang="en-US" sz="1600" dirty="0"/>
+                        <a:t>+ </a:t>
+                      </a:r>
+                      <a:r>
+                        <a:rPr lang="en-US" sz="1600" dirty="0" err="1"/>
+                        <a:t>setPrecioPremium</a:t>
+                      </a:r>
+                      <a:r>
+                        <a:rPr lang="en-US" sz="1600" dirty="0"/>
+                        <a:t>(double </a:t>
+                      </a:r>
+                      <a:r>
+                        <a:rPr lang="en-US" sz="1600" dirty="0" err="1"/>
+                        <a:t>nuevoPrecio</a:t>
+                      </a:r>
+                      <a:r>
+                        <a:rPr lang="en-US" sz="1600" dirty="0"/>
+                        <a:t>): void</a:t>
+                      </a:r>
+                    </a:p>
+                    <a:p>
+                      <a:r>
+                        <a:rPr lang="en-US" sz="1600" dirty="0"/>
+                        <a:t>+ </a:t>
+                      </a:r>
+                      <a:r>
+                        <a:rPr lang="en-US" sz="1600" dirty="0" err="1"/>
+                        <a:t>setPrecioEcoExtra</a:t>
+                      </a:r>
+                      <a:r>
+                        <a:rPr lang="en-US" sz="1600" dirty="0"/>
+                        <a:t>(double </a:t>
+                      </a:r>
+                      <a:r>
+                        <a:rPr lang="en-US" sz="1600" dirty="0" err="1"/>
+                        <a:t>nuevoPrecio</a:t>
+                      </a:r>
+                      <a:r>
+                        <a:rPr lang="en-US" sz="1600" dirty="0"/>
+                        <a:t>): void</a:t>
+                      </a:r>
+                      <a:endParaRPr lang="es-CO" sz="1600" dirty="0"/>
+                    </a:p>
+                  </a:txBody>
+                  <a:tcPr/>
+                </a:tc>
+                <a:extLst>
+                  <a:ext uri="{0D108BD9-81ED-4DB2-BD59-A6C34878D82A}">
+                    <a16:rowId xmlns:a16="http://schemas.microsoft.com/office/drawing/2014/main" val="3981641375"/>
+                  </a:ext>
+                </a:extLst>
+              </a:tr>
+            </a:tbl>
+          </a:graphicData>
+        </a:graphic>
+      </p:graphicFrame>
+      <p:graphicFrame>
+        <p:nvGraphicFramePr>
+          <p:cNvPr id="7" name="Tabla 6">
+            <a:extLst>
+              <a:ext uri="{FF2B5EF4-FFF2-40B4-BE49-F238E27FC236}">
+                <a16:creationId xmlns:a16="http://schemas.microsoft.com/office/drawing/2014/main" id="{C0D3ED87-FB1A-885B-0987-B50AAC98DE82}"/>
+              </a:ext>
+            </a:extLst>
+          </p:cNvPr>
+          <p:cNvGraphicFramePr>
+            <a:graphicFrameLocks noGrp="1"/>
+          </p:cNvGraphicFramePr>
+          <p:nvPr>
+            <p:extLst>
+              <p:ext uri="{D42A27DB-BD31-4B8C-83A1-F6EECF244321}">
+                <p14:modId xmlns:p14="http://schemas.microsoft.com/office/powerpoint/2010/main" val="424177396"/>
+              </p:ext>
+            </p:extLst>
+          </p:nvPr>
+        </p:nvGraphicFramePr>
+        <p:xfrm>
+          <a:off x="6852698" y="875302"/>
+          <a:ext cx="4735921" cy="4007096"/>
+        </p:xfrm>
+        <a:graphic>
+          <a:graphicData uri="http://schemas.openxmlformats.org/drawingml/2006/table">
+            <a:tbl>
+              <a:tblPr firstRow="1" bandRow="1">
+                <a:tableStyleId>{D7AC3CCA-C797-4891-BE02-D94E43425B78}</a:tableStyleId>
+              </a:tblPr>
+              <a:tblGrid>
+                <a:gridCol w="4735921">
                   <a:extLst>
                     <a:ext uri="{9D8B030D-6E8A-4147-A177-3AD203B41FA5}">
                       <a16:colId xmlns:a16="http://schemas.microsoft.com/office/drawing/2014/main" val="869675443"/>
@@ -3390,7 +3988,7 @@
                       <a:pPr algn="ctr"/>
                       <a:r>
                         <a:rPr lang="es-ES" sz="1600" dirty="0"/>
-                        <a:t>Estación</a:t>
+                        <a:t>Red</a:t>
                       </a:r>
                       <a:endParaRPr lang="es-CO" sz="1600" dirty="0"/>
                     </a:p>
@@ -3403,71 +4001,39 @@
                   </a:ext>
                 </a:extLst>
               </a:tr>
-              <a:tr h="1228866">
+              <a:tr h="881759">
                 <a:tc>
                   <a:txBody>
                     <a:bodyPr/>
                     <a:lstStyle/>
                     <a:p>
-                      <a:r>
-                        <a:rPr lang="en-US" sz="1600" dirty="0"/>
-                        <a:t>- id: int </a:t>
+                      <a:pPr marL="285750" indent="-285750">
+                        <a:buFontTx/>
+                        <a:buChar char="-"/>
+                      </a:pPr>
+                      <a:r>
+                        <a:rPr lang="es-ES" sz="1600"/>
+                        <a:t>nombreArchivo: string</a:t>
                       </a:r>
                     </a:p>
                     <a:p>
-                      <a:r>
-                        <a:rPr lang="en-US" sz="1600" dirty="0"/>
-                        <a:t> - </a:t>
-                      </a:r>
-                      <a:r>
-                        <a:rPr lang="en-US" sz="1600" dirty="0" err="1"/>
-                        <a:t>nombre</a:t>
-                      </a:r>
-                      <a:r>
-                        <a:rPr lang="en-US" sz="1600" dirty="0"/>
-                        <a:t>: string </a:t>
+                      <a:pPr marL="285750" indent="-285750">
+                        <a:buFontTx/>
+                        <a:buChar char="-"/>
+                      </a:pPr>
+                      <a:r>
+                        <a:rPr lang="es-ES" sz="1600"/>
+                        <a:t>estaciones: Estacion[100]</a:t>
                       </a:r>
                     </a:p>
                     <a:p>
-                      <a:r>
-                        <a:rPr lang="en-US" sz="1600" dirty="0"/>
-                        <a:t> - </a:t>
-                      </a:r>
-                      <a:r>
-                        <a:rPr lang="en-US" sz="1600" dirty="0" err="1"/>
-                        <a:t>precioRegular</a:t>
-                      </a:r>
-                      <a:r>
-                        <a:rPr lang="en-US" sz="1600" dirty="0"/>
-                        <a:t>: double </a:t>
-                      </a:r>
-                    </a:p>
-                    <a:p>
-                      <a:r>
-                        <a:rPr lang="en-US" sz="1600" dirty="0"/>
-                        <a:t> - </a:t>
-                      </a:r>
-                      <a:r>
-                        <a:rPr lang="en-US" sz="1600" dirty="0" err="1"/>
-                        <a:t>precioPremium</a:t>
-                      </a:r>
-                      <a:r>
-                        <a:rPr lang="en-US" sz="1600" dirty="0"/>
-                        <a:t>: double </a:t>
-                      </a:r>
-                    </a:p>
-                    <a:p>
-                      <a:r>
-                        <a:rPr lang="en-US" sz="1600" dirty="0"/>
-                        <a:t>- </a:t>
-                      </a:r>
-                      <a:r>
-                        <a:rPr lang="en-US" sz="1600" dirty="0" err="1"/>
-                        <a:t>precioEcoExtra</a:t>
-                      </a:r>
-                      <a:r>
-                        <a:rPr lang="en-US" sz="1600" dirty="0"/>
-                        <a:t>: double </a:t>
+                      <a:pPr marL="285750" indent="-285750">
+                        <a:buFontTx/>
+                        <a:buChar char="-"/>
+                      </a:pPr>
+                      <a:r>
+                        <a:rPr lang="es-ES" sz="1600"/>
+                        <a:t>numEstaciones: int</a:t>
                       </a:r>
                       <a:endParaRPr lang="es-CO" sz="1600" dirty="0"/>
                     </a:p>
@@ -3488,23 +4054,15 @@
                     <a:p>
                       <a:r>
                         <a:rPr lang="es-CO" sz="1600" dirty="0"/>
-                        <a:t>- </a:t>
-                      </a:r>
-                      <a:r>
-                        <a:rPr lang="es-CO" sz="1600" dirty="0" err="1"/>
-                        <a:t>Estacion</a:t>
-                      </a:r>
-                      <a:r>
-                        <a:rPr lang="es-CO" sz="1600" dirty="0"/>
-                        <a:t>(id: </a:t>
-                      </a:r>
-                      <a:r>
-                        <a:rPr lang="es-CO" sz="1600" dirty="0" err="1"/>
-                        <a:t>int</a:t>
-                      </a:r>
-                      <a:r>
-                        <a:rPr lang="es-CO" sz="1600" dirty="0"/>
-                        <a:t>, nombre: </a:t>
+                        <a:t>+ Red(</a:t>
+                      </a:r>
+                      <a:r>
+                        <a:rPr lang="es-CO" sz="1600" dirty="0" err="1"/>
+                        <a:t>const</a:t>
+                      </a:r>
+                      <a:r>
+                        <a:rPr lang="es-CO" sz="1600" dirty="0"/>
+                        <a:t> </a:t>
                       </a:r>
                       <a:r>
                         <a:rPr lang="es-CO" sz="1600" dirty="0" err="1"/>
@@ -3512,452 +4070,29 @@
                       </a:r>
                       <a:r>
                         <a:rPr lang="es-CO" sz="1600" dirty="0"/>
-                        <a:t>, </a:t>
-                      </a:r>
-                      <a:r>
-                        <a:rPr lang="es-CO" sz="1600" dirty="0" err="1"/>
-                        <a:t>precioRegular</a:t>
-                      </a:r>
-                      <a:r>
-                        <a:rPr lang="es-CO" sz="1600" dirty="0"/>
-                        <a:t>: </a:t>
-                      </a:r>
-                      <a:r>
-                        <a:rPr lang="es-CO" sz="1600" dirty="0" err="1"/>
-                        <a:t>double</a:t>
-                      </a:r>
-                      <a:r>
-                        <a:rPr lang="es-CO" sz="1600" dirty="0"/>
-                        <a:t>, </a:t>
-                      </a:r>
-                      <a:r>
-                        <a:rPr lang="es-CO" sz="1600" dirty="0" err="1"/>
-                        <a:t>precioPremium</a:t>
-                      </a:r>
-                      <a:r>
-                        <a:rPr lang="es-CO" sz="1600" dirty="0"/>
-                        <a:t>: </a:t>
-                      </a:r>
-                      <a:r>
-                        <a:rPr lang="es-CO" sz="1600" dirty="0" err="1"/>
-                        <a:t>double</a:t>
-                      </a:r>
-                      <a:r>
-                        <a:rPr lang="es-CO" sz="1600" dirty="0"/>
-                        <a:t>, </a:t>
-                      </a:r>
-                      <a:r>
-                        <a:rPr lang="es-CO" sz="1600" dirty="0" err="1"/>
-                        <a:t>precioEcoExtra</a:t>
-                      </a:r>
-                      <a:r>
-                        <a:rPr lang="es-CO" sz="1600" dirty="0"/>
-                        <a:t>: </a:t>
-                      </a:r>
-                      <a:r>
-                        <a:rPr lang="es-CO" sz="1600" dirty="0" err="1"/>
-                        <a:t>double</a:t>
-                      </a:r>
-                      <a:r>
-                        <a:rPr lang="es-CO" sz="1600" dirty="0"/>
-                        <a:t>) </a:t>
+                        <a:t>&amp; </a:t>
+                      </a:r>
+                      <a:r>
+                        <a:rPr lang="es-CO" sz="1600" dirty="0" err="1"/>
+                        <a:t>nombreArchivo</a:t>
+                      </a:r>
+                      <a:r>
+                        <a:rPr lang="es-CO" sz="1600" dirty="0"/>
+                        <a:t>)</a:t>
                       </a:r>
                     </a:p>
                     <a:p>
                       <a:r>
                         <a:rPr lang="es-CO" sz="1600" dirty="0"/>
-                        <a:t>- </a:t>
-                      </a:r>
-                      <a:r>
-                        <a:rPr lang="es-CO" sz="1600" dirty="0" err="1"/>
-                        <a:t>mostrarPrecios</a:t>
+                        <a:t>+ </a:t>
+                      </a:r>
+                      <a:r>
+                        <a:rPr lang="es-CO" sz="1600" dirty="0" err="1"/>
+                        <a:t>cargarDesdeArchivo</a:t>
                       </a:r>
                       <a:r>
                         <a:rPr lang="es-CO" sz="1600" dirty="0"/>
                         <a:t>(): </a:t>
-                      </a:r>
-                      <a:r>
-                        <a:rPr lang="es-CO" sz="1600" dirty="0" err="1"/>
-                        <a:t>void</a:t>
-                      </a:r>
-                      <a:r>
-                        <a:rPr lang="es-CO" sz="1600" dirty="0"/>
-                        <a:t> </a:t>
-                      </a:r>
-                    </a:p>
-                    <a:p>
-                      <a:r>
-                        <a:rPr lang="es-CO" sz="1600" dirty="0"/>
-                        <a:t> - </a:t>
-                      </a:r>
-                      <a:r>
-                        <a:rPr lang="es-CO" sz="1600" dirty="0" err="1"/>
-                        <a:t>getId</a:t>
-                      </a:r>
-                      <a:r>
-                        <a:rPr lang="es-CO" sz="1600" dirty="0"/>
-                        <a:t>(): </a:t>
-                      </a:r>
-                      <a:r>
-                        <a:rPr lang="es-CO" sz="1600" dirty="0" err="1"/>
-                        <a:t>int</a:t>
-                      </a:r>
-                      <a:r>
-                        <a:rPr lang="es-CO" sz="1600" dirty="0"/>
-                        <a:t> </a:t>
-                      </a:r>
-                    </a:p>
-                    <a:p>
-                      <a:r>
-                        <a:rPr lang="es-CO" sz="1600" dirty="0"/>
-                        <a:t> - </a:t>
-                      </a:r>
-                      <a:r>
-                        <a:rPr lang="es-CO" sz="1600" dirty="0" err="1"/>
-                        <a:t>getNombre</a:t>
-                      </a:r>
-                      <a:r>
-                        <a:rPr lang="es-CO" sz="1600" dirty="0"/>
-                        <a:t>(): </a:t>
-                      </a:r>
-                      <a:r>
-                        <a:rPr lang="es-CO" sz="1600" dirty="0" err="1"/>
-                        <a:t>string</a:t>
-                      </a:r>
-                      <a:r>
-                        <a:rPr lang="es-CO" sz="1600" dirty="0"/>
-                        <a:t> </a:t>
-                      </a:r>
-                    </a:p>
-                    <a:p>
-                      <a:r>
-                        <a:rPr lang="es-CO" sz="1600" dirty="0"/>
-                        <a:t> - </a:t>
-                      </a:r>
-                      <a:r>
-                        <a:rPr lang="es-CO" sz="1600" dirty="0" err="1"/>
-                        <a:t>getPrecioRegular</a:t>
-                      </a:r>
-                      <a:r>
-                        <a:rPr lang="es-CO" sz="1600" dirty="0"/>
-                        <a:t>(): </a:t>
-                      </a:r>
-                      <a:r>
-                        <a:rPr lang="es-CO" sz="1600" dirty="0" err="1"/>
-                        <a:t>double</a:t>
-                      </a:r>
-                      <a:r>
-                        <a:rPr lang="es-CO" sz="1600" dirty="0"/>
-                        <a:t> </a:t>
-                      </a:r>
-                    </a:p>
-                    <a:p>
-                      <a:r>
-                        <a:rPr lang="es-CO" sz="1600" dirty="0"/>
-                        <a:t> - </a:t>
-                      </a:r>
-                      <a:r>
-                        <a:rPr lang="es-CO" sz="1600" dirty="0" err="1"/>
-                        <a:t>getPrecioPremium</a:t>
-                      </a:r>
-                      <a:r>
-                        <a:rPr lang="es-CO" sz="1600" dirty="0"/>
-                        <a:t>(): </a:t>
-                      </a:r>
-                      <a:r>
-                        <a:rPr lang="es-CO" sz="1600" dirty="0" err="1"/>
-                        <a:t>double</a:t>
-                      </a:r>
-                      <a:r>
-                        <a:rPr lang="es-CO" sz="1600" dirty="0"/>
-                        <a:t> </a:t>
-                      </a:r>
-                    </a:p>
-                    <a:p>
-                      <a:r>
-                        <a:rPr lang="es-CO" sz="1600" dirty="0"/>
-                        <a:t>- </a:t>
-                      </a:r>
-                      <a:r>
-                        <a:rPr lang="es-CO" sz="1600" dirty="0" err="1"/>
-                        <a:t>getPrecioEcoExtra</a:t>
-                      </a:r>
-                      <a:r>
-                        <a:rPr lang="es-CO" sz="1600" dirty="0"/>
-                        <a:t>(): </a:t>
-                      </a:r>
-                      <a:r>
-                        <a:rPr lang="es-CO" sz="1600" dirty="0" err="1"/>
-                        <a:t>double</a:t>
-                      </a:r>
-                      <a:r>
-                        <a:rPr lang="es-CO" sz="1600" dirty="0"/>
-                        <a:t> </a:t>
-                      </a:r>
-                    </a:p>
-                  </a:txBody>
-                  <a:tcPr/>
-                </a:tc>
-                <a:extLst>
-                  <a:ext uri="{0D108BD9-81ED-4DB2-BD59-A6C34878D82A}">
-                    <a16:rowId xmlns:a16="http://schemas.microsoft.com/office/drawing/2014/main" val="3981641375"/>
-                  </a:ext>
-                </a:extLst>
-              </a:tr>
-            </a:tbl>
-          </a:graphicData>
-        </a:graphic>
-      </p:graphicFrame>
-      <p:graphicFrame>
-        <p:nvGraphicFramePr>
-          <p:cNvPr id="7" name="Tabla 6">
-            <a:extLst>
-              <a:ext uri="{FF2B5EF4-FFF2-40B4-BE49-F238E27FC236}">
-                <a16:creationId xmlns:a16="http://schemas.microsoft.com/office/drawing/2014/main" id="{C0D3ED87-FB1A-885B-0987-B50AAC98DE82}"/>
-              </a:ext>
-            </a:extLst>
-          </p:cNvPr>
-          <p:cNvGraphicFramePr>
-            <a:graphicFrameLocks noGrp="1"/>
-          </p:cNvGraphicFramePr>
-          <p:nvPr>
-            <p:extLst>
-              <p:ext uri="{D42A27DB-BD31-4B8C-83A1-F6EECF244321}">
-                <p14:modId xmlns:p14="http://schemas.microsoft.com/office/powerpoint/2010/main" val="353612627"/>
-              </p:ext>
-            </p:extLst>
-          </p:nvPr>
-        </p:nvGraphicFramePr>
-        <p:xfrm>
-          <a:off x="6859555" y="924938"/>
-          <a:ext cx="3536302" cy="4598043"/>
-        </p:xfrm>
-        <a:graphic>
-          <a:graphicData uri="http://schemas.openxmlformats.org/drawingml/2006/table">
-            <a:tbl>
-              <a:tblPr firstRow="1" bandRow="1">
-                <a:tableStyleId>{D7AC3CCA-C797-4891-BE02-D94E43425B78}</a:tableStyleId>
-              </a:tblPr>
-              <a:tblGrid>
-                <a:gridCol w="3536302">
-                  <a:extLst>
-                    <a:ext uri="{9D8B030D-6E8A-4147-A177-3AD203B41FA5}">
-                      <a16:colId xmlns:a16="http://schemas.microsoft.com/office/drawing/2014/main" val="869675443"/>
-                    </a:ext>
-                  </a:extLst>
-                </a:gridCol>
-              </a:tblGrid>
-              <a:tr h="351657">
-                <a:tc>
-                  <a:txBody>
-                    <a:bodyPr/>
-                    <a:lstStyle/>
-                    <a:p>
-                      <a:pPr algn="ctr"/>
-                      <a:r>
-                        <a:rPr lang="es-ES" sz="1600" dirty="0"/>
-                        <a:t>Red</a:t>
-                      </a:r>
-                      <a:endParaRPr lang="es-CO" sz="1600" dirty="0"/>
-                    </a:p>
-                  </a:txBody>
-                  <a:tcPr/>
-                </a:tc>
-                <a:extLst>
-                  <a:ext uri="{0D108BD9-81ED-4DB2-BD59-A6C34878D82A}">
-                    <a16:rowId xmlns:a16="http://schemas.microsoft.com/office/drawing/2014/main" val="4245628218"/>
-                  </a:ext>
-                </a:extLst>
-              </a:tr>
-              <a:tr h="1228866">
-                <a:tc>
-                  <a:txBody>
-                    <a:bodyPr/>
-                    <a:lstStyle/>
-                    <a:p>
-                      <a:pPr marL="285750" indent="-285750">
-                        <a:buFontTx/>
-                        <a:buChar char="-"/>
-                      </a:pPr>
-                      <a:r>
-                        <a:rPr lang="es-CO" sz="1600" dirty="0" err="1"/>
-                        <a:t>nombreArchivo</a:t>
-                      </a:r>
-                      <a:r>
-                        <a:rPr lang="es-CO" sz="1600" dirty="0"/>
-                        <a:t>: </a:t>
-                      </a:r>
-                      <a:r>
-                        <a:rPr lang="es-CO" sz="1600" dirty="0" err="1"/>
-                        <a:t>string</a:t>
-                      </a:r>
-                      <a:r>
-                        <a:rPr lang="es-CO" sz="1600" dirty="0"/>
-                        <a:t> </a:t>
-                      </a:r>
-                    </a:p>
-                    <a:p>
-                      <a:pPr marL="285750" indent="-285750">
-                        <a:buFontTx/>
-                        <a:buChar char="-"/>
-                      </a:pPr>
-                      <a:r>
-                        <a:rPr lang="es-CO" sz="1600" dirty="0"/>
-                        <a:t>- estaciones: </a:t>
-                      </a:r>
-                      <a:r>
-                        <a:rPr lang="es-CO" sz="1600" dirty="0" err="1"/>
-                        <a:t>Estacion</a:t>
-                      </a:r>
-                      <a:r>
-                        <a:rPr lang="es-CO" sz="1600" dirty="0"/>
-                        <a:t>[100] </a:t>
-                      </a:r>
-                    </a:p>
-                    <a:p>
-                      <a:pPr marL="285750" indent="-285750">
-                        <a:buFontTx/>
-                        <a:buChar char="-"/>
-                      </a:pPr>
-                      <a:r>
-                        <a:rPr lang="es-CO" sz="1600" dirty="0"/>
-                        <a:t>- nombre: </a:t>
-                      </a:r>
-                      <a:r>
-                        <a:rPr lang="es-CO" sz="1600" dirty="0" err="1"/>
-                        <a:t>string</a:t>
-                      </a:r>
-                      <a:r>
-                        <a:rPr lang="es-CO" sz="1600" dirty="0"/>
-                        <a:t> </a:t>
-                      </a:r>
-                    </a:p>
-                    <a:p>
-                      <a:pPr marL="285750" indent="-285750">
-                        <a:buFontTx/>
-                        <a:buChar char="-"/>
-                      </a:pPr>
-                      <a:r>
-                        <a:rPr lang="es-CO" sz="1600" dirty="0"/>
-                        <a:t>- </a:t>
-                      </a:r>
-                      <a:r>
-                        <a:rPr lang="es-CO" sz="1600" dirty="0" err="1"/>
-                        <a:t>numEstaciones</a:t>
-                      </a:r>
-                      <a:r>
-                        <a:rPr lang="es-CO" sz="1600" dirty="0"/>
-                        <a:t>: </a:t>
-                      </a:r>
-                      <a:r>
-                        <a:rPr lang="es-CO" sz="1600" dirty="0" err="1"/>
-                        <a:t>int</a:t>
-                      </a:r>
-                      <a:r>
-                        <a:rPr lang="es-CO" sz="1600" dirty="0"/>
-                        <a:t> </a:t>
-                      </a:r>
-                    </a:p>
-                  </a:txBody>
-                  <a:tcPr/>
-                </a:tc>
-                <a:extLst>
-                  <a:ext uri="{0D108BD9-81ED-4DB2-BD59-A6C34878D82A}">
-                    <a16:rowId xmlns:a16="http://schemas.microsoft.com/office/drawing/2014/main" val="2497062512"/>
-                  </a:ext>
-                </a:extLst>
-              </a:tr>
-              <a:tr h="2150515">
-                <a:tc>
-                  <a:txBody>
-                    <a:bodyPr/>
-                    <a:lstStyle/>
-                    <a:p>
-                      <a:r>
-                        <a:rPr lang="es-CO" sz="1600" dirty="0"/>
-                        <a:t>- Red(</a:t>
-                      </a:r>
-                      <a:r>
-                        <a:rPr lang="es-CO" sz="1600" dirty="0" err="1"/>
-                        <a:t>nombreArchivo</a:t>
-                      </a:r>
-                      <a:r>
-                        <a:rPr lang="es-CO" sz="1600" dirty="0"/>
-                        <a:t>: </a:t>
-                      </a:r>
-                      <a:r>
-                        <a:rPr lang="es-CO" sz="1600" dirty="0" err="1"/>
-                        <a:t>string</a:t>
-                      </a:r>
-                      <a:r>
-                        <a:rPr lang="es-CO" sz="1600" dirty="0"/>
-                        <a:t> </a:t>
-                      </a:r>
-                    </a:p>
-                    <a:p>
-                      <a:r>
-                        <a:rPr lang="es-CO" sz="1600" dirty="0"/>
-                        <a:t> - </a:t>
-                      </a:r>
-                      <a:r>
-                        <a:rPr lang="es-CO" sz="1600" dirty="0" err="1"/>
-                        <a:t>cargarDesdeArchivo</a:t>
-                      </a:r>
-                      <a:r>
-                        <a:rPr lang="es-CO" sz="1600" dirty="0"/>
-                        <a:t>(): </a:t>
-                      </a:r>
-                      <a:r>
-                        <a:rPr lang="es-CO" sz="1600" dirty="0" err="1"/>
-                        <a:t>void</a:t>
-                      </a:r>
-                      <a:r>
-                        <a:rPr lang="es-CO" sz="1600" dirty="0"/>
-                        <a:t> </a:t>
-                      </a:r>
-                    </a:p>
-                    <a:p>
-                      <a:r>
-                        <a:rPr lang="es-CO" sz="1600" dirty="0"/>
-                        <a:t> - </a:t>
-                      </a:r>
-                      <a:r>
-                        <a:rPr lang="es-CO" sz="1600" dirty="0" err="1"/>
-                        <a:t>guardarEnArchivo</a:t>
-                      </a:r>
-                      <a:r>
-                        <a:rPr lang="es-CO" sz="1600" dirty="0"/>
-                        <a:t>(): </a:t>
-                      </a:r>
-                      <a:r>
-                        <a:rPr lang="es-CO" sz="1600" dirty="0" err="1"/>
-                        <a:t>void</a:t>
-                      </a:r>
-                      <a:r>
-                        <a:rPr lang="es-CO" sz="1600" dirty="0"/>
-                        <a:t> </a:t>
-                      </a:r>
-                    </a:p>
-                    <a:p>
-                      <a:r>
-                        <a:rPr lang="es-CO" sz="1600" dirty="0"/>
-                        <a:t> - </a:t>
-                      </a:r>
-                      <a:r>
-                        <a:rPr lang="es-CO" sz="1600" dirty="0" err="1"/>
-                        <a:t>agregarEstacion</a:t>
-                      </a:r>
-                      <a:r>
-                        <a:rPr lang="es-CO" sz="1600" dirty="0"/>
-                        <a:t>(</a:t>
-                      </a:r>
-                      <a:r>
-                        <a:rPr lang="es-CO" sz="1600" dirty="0" err="1"/>
-                        <a:t>estacion:Estacion</a:t>
-                      </a:r>
-                      <a:r>
-                        <a:rPr lang="es-CO" sz="1600" dirty="0"/>
-                        <a:t>): </a:t>
                       </a:r>
                       <a:r>
                         <a:rPr lang="es-CO" sz="1600" dirty="0" err="1"/>
@@ -3968,31 +4103,23 @@
                     <a:p>
                       <a:r>
                         <a:rPr lang="es-CO" sz="1600" dirty="0"/>
-                        <a:t>- </a:t>
-                      </a:r>
-                      <a:r>
-                        <a:rPr lang="es-CO" sz="1600" dirty="0" err="1"/>
-                        <a:t>eliminarEstacion</a:t>
-                      </a:r>
-                      <a:r>
-                        <a:rPr lang="es-CO" sz="1600" dirty="0"/>
-                        <a:t>(</a:t>
-                      </a:r>
-                      <a:r>
-                        <a:rPr lang="es-CO" sz="1600" dirty="0" err="1"/>
-                        <a:t>indice</a:t>
+                        <a:t>+ </a:t>
+                      </a:r>
+                      <a:r>
+                        <a:rPr lang="es-CO" sz="1600" dirty="0" err="1"/>
+                        <a:t>guardarEnArchivo</a:t>
+                      </a:r>
+                      <a:r>
+                        <a:rPr lang="es-CO" sz="1600" dirty="0"/>
+                        <a:t>() </a:t>
+                      </a:r>
+                      <a:r>
+                        <a:rPr lang="es-CO" sz="1600" dirty="0" err="1"/>
+                        <a:t>const</a:t>
                       </a:r>
                       <a:r>
                         <a:rPr lang="es-CO" sz="1600" dirty="0"/>
                         <a:t>: </a:t>
-                      </a:r>
-                      <a:r>
-                        <a:rPr lang="es-CO" sz="1600" dirty="0" err="1"/>
-                        <a:t>int</a:t>
-                      </a:r>
-                      <a:r>
-                        <a:rPr lang="es-CO" sz="1600" dirty="0"/>
-                        <a:t>): </a:t>
                       </a:r>
                       <a:r>
                         <a:rPr lang="es-CO" sz="1600" dirty="0" err="1"/>
@@ -4003,73 +4130,35 @@
                     <a:p>
                       <a:r>
                         <a:rPr lang="es-CO" sz="1600" dirty="0"/>
-                        <a:t>- </a:t>
-                      </a:r>
-                      <a:r>
-                        <a:rPr lang="es-CO" sz="1600" dirty="0" err="1"/>
-                        <a:t>mostrarEstaciones</a:t>
-                      </a:r>
-                      <a:r>
-                        <a:rPr lang="es-CO" sz="1600" dirty="0"/>
-                        <a:t>(): </a:t>
-                      </a:r>
-                      <a:r>
-                        <a:rPr lang="es-CO" sz="1600" dirty="0" err="1"/>
-                        <a:t>void</a:t>
+                        <a:t>+ </a:t>
+                      </a:r>
+                      <a:r>
+                        <a:rPr lang="es-CO" sz="1600" dirty="0" err="1"/>
+                        <a:t>agregarEstacion</a:t>
+                      </a:r>
+                      <a:r>
+                        <a:rPr lang="es-CO" sz="1600" dirty="0"/>
+                        <a:t>(</a:t>
+                      </a:r>
+                      <a:r>
+                        <a:rPr lang="es-CO" sz="1600" dirty="0" err="1"/>
+                        <a:t>const</a:t>
                       </a:r>
                       <a:r>
                         <a:rPr lang="es-CO" sz="1600" dirty="0"/>
                         <a:t> </a:t>
                       </a:r>
-                    </a:p>
-                    <a:p>
-                      <a:r>
-                        <a:rPr lang="es-CO" sz="1600" dirty="0"/>
-                        <a:t>- </a:t>
-                      </a:r>
-                      <a:r>
-                        <a:rPr lang="es-CO" sz="1600" dirty="0" err="1"/>
-                        <a:t>registrarVentaEnEstacion</a:t>
-                      </a:r>
-                      <a:r>
-                        <a:rPr lang="es-CO" sz="1600" dirty="0"/>
-                        <a:t>(</a:t>
-                      </a:r>
-                      <a:r>
-                        <a:rPr lang="es-CO" sz="1600" dirty="0" err="1"/>
-                        <a:t>indice</a:t>
-                      </a:r>
-                      <a:r>
-                        <a:rPr lang="es-CO" sz="1600" dirty="0"/>
-                        <a:t>: </a:t>
-                      </a:r>
-                      <a:r>
-                        <a:rPr lang="es-CO" sz="1600" dirty="0" err="1"/>
-                        <a:t>int</a:t>
-                      </a:r>
-                      <a:r>
-                        <a:rPr lang="es-CO" sz="1600" dirty="0"/>
-                        <a:t>, cantidad: </a:t>
-                      </a:r>
-                      <a:r>
-                        <a:rPr lang="es-CO" sz="1600" dirty="0" err="1"/>
-                        <a:t>double</a:t>
-                      </a:r>
-                      <a:r>
-                        <a:rPr lang="es-CO" sz="1600" dirty="0"/>
-                        <a:t>, </a:t>
-                      </a:r>
-                      <a:r>
-                        <a:rPr lang="es-CO" sz="1600" dirty="0" err="1"/>
-                        <a:t>tipoGasolina</a:t>
-                      </a:r>
-                      <a:r>
-                        <a:rPr lang="es-CO" sz="1600" dirty="0"/>
-                        <a:t>: </a:t>
-                      </a:r>
-                      <a:r>
-                        <a:rPr lang="es-CO" sz="1600" dirty="0" err="1"/>
-                        <a:t>string</a:t>
+                      <a:r>
+                        <a:rPr lang="es-CO" sz="1600" dirty="0" err="1"/>
+                        <a:t>Estacion</a:t>
+                      </a:r>
+                      <a:r>
+                        <a:rPr lang="es-CO" sz="1600" dirty="0"/>
+                        <a:t>&amp; </a:t>
+                      </a:r>
+                      <a:r>
+                        <a:rPr lang="es-CO" sz="1600" dirty="0" err="1"/>
+                        <a:t>estacion</a:t>
                       </a:r>
                       <a:r>
                         <a:rPr lang="es-CO" sz="1600" dirty="0"/>
@@ -4084,38 +4173,207 @@
                     <a:p>
                       <a:r>
                         <a:rPr lang="es-CO" sz="1600" dirty="0"/>
-                        <a:t>- </a:t>
-                      </a:r>
-                      <a:r>
-                        <a:rPr lang="es-CO" sz="1600" dirty="0" err="1"/>
-                        <a:t>getNumEstaciones</a:t>
-                      </a:r>
-                      <a:r>
-                        <a:rPr lang="es-CO" sz="1600" dirty="0"/>
-                        <a:t>(): </a:t>
+                        <a:t>+ </a:t>
+                      </a:r>
+                      <a:r>
+                        <a:rPr lang="es-CO" sz="1600" dirty="0" err="1"/>
+                        <a:t>eliminarEstacion</a:t>
+                      </a:r>
+                      <a:r>
+                        <a:rPr lang="es-CO" sz="1600" dirty="0"/>
+                        <a:t>(</a:t>
                       </a:r>
                       <a:r>
                         <a:rPr lang="es-CO" sz="1600" dirty="0" err="1"/>
                         <a:t>int</a:t>
+                      </a:r>
+                      <a:r>
+                        <a:rPr lang="es-CO" sz="1600" dirty="0"/>
+                        <a:t> </a:t>
+                      </a:r>
+                      <a:r>
+                        <a:rPr lang="es-CO" sz="1600" dirty="0" err="1"/>
+                        <a:t>indice</a:t>
+                      </a:r>
+                      <a:r>
+                        <a:rPr lang="es-CO" sz="1600" dirty="0"/>
+                        <a:t>): </a:t>
+                      </a:r>
+                      <a:r>
+                        <a:rPr lang="es-CO" sz="1600" dirty="0" err="1"/>
+                        <a:t>void</a:t>
                       </a:r>
                       <a:endParaRPr lang="es-CO" sz="1600" dirty="0"/>
                     </a:p>
                     <a:p>
                       <a:r>
                         <a:rPr lang="es-CO" sz="1600" dirty="0"/>
-                        <a:t>- </a:t>
-                      </a:r>
-                      <a:r>
-                        <a:rPr lang="es-CO" sz="1600" dirty="0" err="1"/>
-                        <a:t>getNombreArchivo</a:t>
-                      </a:r>
-                      <a:r>
-                        <a:rPr lang="es-CO" sz="1600" dirty="0"/>
-                        <a:t>(): </a:t>
+                        <a:t>+ </a:t>
+                      </a:r>
+                      <a:r>
+                        <a:rPr lang="es-CO" sz="1600" dirty="0" err="1"/>
+                        <a:t>mostrarEstaciones</a:t>
+                      </a:r>
+                      <a:r>
+                        <a:rPr lang="es-CO" sz="1600" dirty="0"/>
+                        <a:t>() </a:t>
+                      </a:r>
+                      <a:r>
+                        <a:rPr lang="es-CO" sz="1600" dirty="0" err="1"/>
+                        <a:t>const</a:t>
+                      </a:r>
+                      <a:r>
+                        <a:rPr lang="es-CO" sz="1600" dirty="0"/>
+                        <a:t>: </a:t>
+                      </a:r>
+                      <a:r>
+                        <a:rPr lang="es-CO" sz="1600" dirty="0" err="1"/>
+                        <a:t>void</a:t>
+                      </a:r>
+                      <a:endParaRPr lang="es-CO" sz="1600" dirty="0"/>
+                    </a:p>
+                    <a:p>
+                      <a:r>
+                        <a:rPr lang="es-CO" sz="1600" dirty="0"/>
+                        <a:t>+ </a:t>
+                      </a:r>
+                      <a:r>
+                        <a:rPr lang="es-CO" sz="1600" dirty="0" err="1"/>
+                        <a:t>mostrarEstacionesConId</a:t>
+                      </a:r>
+                      <a:r>
+                        <a:rPr lang="es-CO" sz="1600" dirty="0"/>
+                        <a:t>() </a:t>
+                      </a:r>
+                      <a:r>
+                        <a:rPr lang="es-CO" sz="1600" dirty="0" err="1"/>
+                        <a:t>const</a:t>
+                      </a:r>
+                      <a:r>
+                        <a:rPr lang="es-CO" sz="1600" dirty="0"/>
+                        <a:t>: </a:t>
+                      </a:r>
+                      <a:r>
+                        <a:rPr lang="es-CO" sz="1600" dirty="0" err="1"/>
+                        <a:t>void</a:t>
+                      </a:r>
+                      <a:endParaRPr lang="es-CO" sz="1600" dirty="0"/>
+                    </a:p>
+                    <a:p>
+                      <a:r>
+                        <a:rPr lang="es-CO" sz="1600" dirty="0"/>
+                        <a:t>+ </a:t>
+                      </a:r>
+                      <a:r>
+                        <a:rPr lang="es-CO" sz="1600" dirty="0" err="1"/>
+                        <a:t>eliminarEstacionPorId</a:t>
+                      </a:r>
+                      <a:r>
+                        <a:rPr lang="es-CO" sz="1600" dirty="0"/>
+                        <a:t>(</a:t>
+                      </a:r>
+                      <a:r>
+                        <a:rPr lang="es-CO" sz="1600" dirty="0" err="1"/>
+                        <a:t>int</a:t>
+                      </a:r>
+                      <a:r>
+                        <a:rPr lang="es-CO" sz="1600" dirty="0"/>
+                        <a:t> id): </a:t>
+                      </a:r>
+                      <a:r>
+                        <a:rPr lang="es-CO" sz="1600" dirty="0" err="1"/>
+                        <a:t>void</a:t>
+                      </a:r>
+                      <a:endParaRPr lang="es-CO" sz="1600" dirty="0"/>
+                    </a:p>
+                    <a:p>
+                      <a:r>
+                        <a:rPr lang="es-CO" sz="1600" dirty="0"/>
+                        <a:t>+ </a:t>
+                      </a:r>
+                      <a:r>
+                        <a:rPr lang="es-CO" sz="1600" dirty="0" err="1"/>
+                        <a:t>registrarVentaEnEstacion</a:t>
+                      </a:r>
+                      <a:r>
+                        <a:rPr lang="es-CO" sz="1600" dirty="0"/>
+                        <a:t>(</a:t>
+                      </a:r>
+                      <a:r>
+                        <a:rPr lang="es-CO" sz="1600" dirty="0" err="1"/>
+                        <a:t>int</a:t>
+                      </a:r>
+                      <a:r>
+                        <a:rPr lang="es-CO" sz="1600" dirty="0"/>
+                        <a:t> </a:t>
+                      </a:r>
+                      <a:r>
+                        <a:rPr lang="es-CO" sz="1600" dirty="0" err="1"/>
+                        <a:t>indice</a:t>
+                      </a:r>
+                      <a:r>
+                        <a:rPr lang="es-CO" sz="1600" dirty="0"/>
+                        <a:t>, </a:t>
+                      </a:r>
+                      <a:r>
+                        <a:rPr lang="es-CO" sz="1600" dirty="0" err="1"/>
+                        <a:t>double</a:t>
+                      </a:r>
+                      <a:r>
+                        <a:rPr lang="es-CO" sz="1600" dirty="0"/>
+                        <a:t> cantidad, </a:t>
+                      </a:r>
+                      <a:r>
+                        <a:rPr lang="es-CO" sz="1600" dirty="0" err="1"/>
+                        <a:t>const</a:t>
+                      </a:r>
+                      <a:r>
+                        <a:rPr lang="es-CO" sz="1600" dirty="0"/>
+                        <a:t> </a:t>
                       </a:r>
                       <a:r>
                         <a:rPr lang="es-CO" sz="1600" dirty="0" err="1"/>
                         <a:t>string</a:t>
+                      </a:r>
+                      <a:r>
+                        <a:rPr lang="es-CO" sz="1600" dirty="0"/>
+                        <a:t>&amp; </a:t>
+                      </a:r>
+                      <a:r>
+                        <a:rPr lang="es-CO" sz="1600" dirty="0" err="1"/>
+                        <a:t>tipoGasolina</a:t>
+                      </a:r>
+                      <a:r>
+                        <a:rPr lang="es-CO" sz="1600" dirty="0"/>
+                        <a:t>, </a:t>
+                      </a:r>
+                      <a:r>
+                        <a:rPr lang="es-CO" sz="1600" dirty="0" err="1"/>
+                        <a:t>const</a:t>
+                      </a:r>
+                      <a:r>
+                        <a:rPr lang="es-CO" sz="1600" dirty="0"/>
+                        <a:t> </a:t>
+                      </a:r>
+                      <a:r>
+                        <a:rPr lang="es-CO" sz="1600" dirty="0" err="1"/>
+                        <a:t>string</a:t>
+                      </a:r>
+                      <a:r>
+                        <a:rPr lang="es-CO" sz="1600" dirty="0"/>
+                        <a:t>&amp; </a:t>
+                      </a:r>
+                      <a:r>
+                        <a:rPr lang="es-CO" sz="1600" dirty="0" err="1"/>
+                        <a:t>metodoPago</a:t>
+                      </a:r>
+                      <a:r>
+                        <a:rPr lang="es-CO" sz="1600" dirty="0"/>
+                        <a:t>): </a:t>
+                      </a:r>
+                      <a:r>
+                        <a:rPr lang="es-CO" sz="1600" dirty="0" err="1"/>
+                        <a:t>bool</a:t>
                       </a:r>
                       <a:endParaRPr lang="es-CO" sz="1600" dirty="0"/>
                     </a:p>
@@ -4149,9 +4407,9 @@
           <p:nvPr/>
         </p:nvCxnSpPr>
         <p:spPr>
-          <a:xfrm>
-            <a:off x="4114802" y="2899086"/>
-            <a:ext cx="2744753" cy="324873"/>
+          <a:xfrm flipV="1">
+            <a:off x="4941352" y="2878850"/>
+            <a:ext cx="1911346" cy="309637"/>
           </a:xfrm>
           <a:prstGeom prst="line">
             <a:avLst/>
@@ -4187,7 +4445,7 @@
         </p:nvSpPr>
         <p:spPr>
           <a:xfrm rot="382955">
-            <a:off x="6566431" y="3095280"/>
+            <a:off x="6611090" y="2751329"/>
             <a:ext cx="295459" cy="293850"/>
           </a:xfrm>
           <a:prstGeom prst="diamond">
@@ -4233,7 +4491,7 @@
         </p:nvSpPr>
         <p:spPr>
           <a:xfrm>
-            <a:off x="6412474" y="2804992"/>
+            <a:off x="6412474" y="2583119"/>
             <a:ext cx="301686" cy="369332"/>
           </a:xfrm>
           <a:prstGeom prst="rect">
@@ -4269,7 +4527,7 @@
         </p:nvSpPr>
         <p:spPr>
           <a:xfrm>
-            <a:off x="4143704" y="2533737"/>
+            <a:off x="5070031" y="2827219"/>
             <a:ext cx="333746" cy="369332"/>
           </a:xfrm>
           <a:prstGeom prst="rect">

</xml_diff>

<commit_message>
#6 - Commit - Verificación De Fuga
se añadió una verificación de fuga cada vez que se va a usar una estación para ver si se esta perdiendo la gasolina
</commit_message>
<xml_diff>
--- a/UML.pptx
+++ b/UML.pptx
@@ -117,12 +117,12 @@
   <pc:docChgLst>
     <pc:chgData name="AndrésE Ramos" userId="699afa22cf2382d0" providerId="LiveId" clId="{E9027C64-0B3B-47A7-9971-6ECB6BD4B82B}"/>
     <pc:docChg chg="undo custSel modSld">
-      <pc:chgData name="AndrésE Ramos" userId="699afa22cf2382d0" providerId="LiveId" clId="{E9027C64-0B3B-47A7-9971-6ECB6BD4B82B}" dt="2024-10-17T01:51:40.245" v="296" actId="1076"/>
+      <pc:chgData name="AndrésE Ramos" userId="699afa22cf2382d0" providerId="LiveId" clId="{E9027C64-0B3B-47A7-9971-6ECB6BD4B82B}" dt="2024-10-17T04:25:15.092" v="319" actId="20577"/>
       <pc:docMkLst>
         <pc:docMk/>
       </pc:docMkLst>
       <pc:sldChg chg="modSp mod">
-        <pc:chgData name="AndrésE Ramos" userId="699afa22cf2382d0" providerId="LiveId" clId="{E9027C64-0B3B-47A7-9971-6ECB6BD4B82B}" dt="2024-10-17T01:51:40.245" v="296" actId="1076"/>
+        <pc:chgData name="AndrésE Ramos" userId="699afa22cf2382d0" providerId="LiveId" clId="{E9027C64-0B3B-47A7-9971-6ECB6BD4B82B}" dt="2024-10-17T04:25:15.092" v="319" actId="20577"/>
         <pc:sldMkLst>
           <pc:docMk/>
           <pc:sldMk cId="1286858207" sldId="256"/>
@@ -152,7 +152,7 @@
           </ac:spMkLst>
         </pc:spChg>
         <pc:graphicFrameChg chg="mod modGraphic">
-          <ac:chgData name="AndrésE Ramos" userId="699afa22cf2382d0" providerId="LiveId" clId="{E9027C64-0B3B-47A7-9971-6ECB6BD4B82B}" dt="2024-10-17T01:23:11.204" v="265" actId="1076"/>
+          <ac:chgData name="AndrésE Ramos" userId="699afa22cf2382d0" providerId="LiveId" clId="{E9027C64-0B3B-47A7-9971-6ECB6BD4B82B}" dt="2024-10-17T04:25:15.092" v="319" actId="20577"/>
           <ac:graphicFrameMkLst>
             <pc:docMk/>
             <pc:sldMk cId="1286858207" sldId="256"/>
@@ -3431,14 +3431,14 @@
           <p:nvPr>
             <p:extLst>
               <p:ext uri="{D42A27DB-BD31-4B8C-83A1-F6EECF244321}">
-                <p14:modId xmlns:p14="http://schemas.microsoft.com/office/powerpoint/2010/main" val="1257000994"/>
+                <p14:modId xmlns:p14="http://schemas.microsoft.com/office/powerpoint/2010/main" val="1697803717"/>
               </p:ext>
             </p:extLst>
           </p:nvPr>
         </p:nvGraphicFramePr>
         <p:xfrm>
           <a:off x="439960" y="283918"/>
-          <a:ext cx="4501392" cy="5809139"/>
+          <a:ext cx="4501392" cy="6017072"/>
         </p:xfrm>
         <a:graphic>
           <a:graphicData uri="http://schemas.openxmlformats.org/drawingml/2006/table">
@@ -3924,6 +3924,20 @@
                       <a:r>
                         <a:rPr lang="en-US" sz="1600" dirty="0"/>
                         <a:t>): void</a:t>
+                      </a:r>
+                    </a:p>
+                    <a:p>
+                      <a:r>
+                        <a:rPr lang="en-US" sz="1600" dirty="0"/>
+                        <a:t>+ </a:t>
+                      </a:r>
+                      <a:r>
+                        <a:rPr lang="en-US" sz="1600" dirty="0" err="1"/>
+                        <a:t>verific_fuga</a:t>
+                      </a:r>
+                      <a:r>
+                        <a:rPr lang="en-US" sz="1600" dirty="0"/>
+                        <a:t>() const : Bool</a:t>
                       </a:r>
                       <a:endParaRPr lang="es-CO" sz="1600" dirty="0"/>
                     </a:p>
@@ -4409,7 +4423,7 @@
         <p:spPr>
           <a:xfrm flipV="1">
             <a:off x="4941352" y="2878850"/>
-            <a:ext cx="1911346" cy="309637"/>
+            <a:ext cx="1911346" cy="413604"/>
           </a:xfrm>
           <a:prstGeom prst="line">
             <a:avLst/>

</xml_diff>